<commit_message>
predictor accepts trace files. See readme in traces.
</commit_message>
<xml_diff>
--- a/Block Diagrams.pptx
+++ b/Block Diagrams.pptx
@@ -4,6 +4,9 @@
   <p:sldMasterIdLst>
     <p:sldMasterId id="2147483648" r:id="rId1"/>
   </p:sldMasterIdLst>
+  <p:notesMasterIdLst>
+    <p:notesMasterId r:id="rId7"/>
+  </p:notesMasterIdLst>
   <p:sldIdLst>
     <p:sldId id="256" r:id="rId2"/>
     <p:sldId id="260" r:id="rId3"/>
@@ -108,7 +111,626 @@
       </a:defRPr>
     </a:lvl9pPr>
   </p:defaultTextStyle>
+  <p:extLst>
+    <p:ext uri="{EFAFB233-063F-42B5-8137-9DF3F51BA10A}">
+      <p15:sldGuideLst xmlns:p15="http://schemas.microsoft.com/office/powerpoint/2012/main"/>
+    </p:ext>
+  </p:extLst>
 </p:presentation>
+</file>
+
+<file path=ppt/revisionInfo.xml><?xml version="1.0" encoding="utf-8"?>
+<p1510:revInfo xmlns:a="http://schemas.openxmlformats.org/drawingml/2006/main" xmlns:r="http://schemas.openxmlformats.org/officeDocument/2006/relationships" xmlns:p1510="http://schemas.microsoft.com/office/powerpoint/2015/10/main">
+  <p1510:revLst>
+    <p1510:client id="{39B28FE9-6231-46D7-934C-73D56C4F3AC2}" v="15" dt="2020-03-12T19:23:04.057"/>
+  </p1510:revLst>
+</p1510:revInfo>
+</file>
+
+<file path=ppt/changesInfos/changesInfo1.xml><?xml version="1.0" encoding="utf-8"?>
+<pc:chgInfo xmlns:a="http://schemas.openxmlformats.org/drawingml/2006/main" xmlns:r="http://schemas.openxmlformats.org/officeDocument/2006/relationships" xmlns:ac="http://schemas.microsoft.com/office/drawing/2013/main/command" xmlns:pc="http://schemas.microsoft.com/office/powerpoint/2013/main/command">
+  <pc:docChgLst>
+    <pc:chgData name="Michael Escue" userId="ab29b3b8207ead18" providerId="LiveId" clId="{39B28FE9-6231-46D7-934C-73D56C4F3AC2}"/>
+    <pc:docChg chg="modSld">
+      <pc:chgData name="Michael Escue" userId="ab29b3b8207ead18" providerId="LiveId" clId="{39B28FE9-6231-46D7-934C-73D56C4F3AC2}" dt="2020-03-12T19:23:11.661" v="29" actId="9405"/>
+      <pc:docMkLst>
+        <pc:docMk/>
+      </pc:docMkLst>
+      <pc:sldChg chg="addSp delSp modSp mod">
+        <pc:chgData name="Michael Escue" userId="ab29b3b8207ead18" providerId="LiveId" clId="{39B28FE9-6231-46D7-934C-73D56C4F3AC2}" dt="2020-03-12T19:23:11.661" v="29" actId="9405"/>
+        <pc:sldMkLst>
+          <pc:docMk/>
+          <pc:sldMk cId="2785217781" sldId="259"/>
+        </pc:sldMkLst>
+        <pc:grpChg chg="del mod">
+          <ac:chgData name="Michael Escue" userId="ab29b3b8207ead18" providerId="LiveId" clId="{39B28FE9-6231-46D7-934C-73D56C4F3AC2}" dt="2020-03-12T19:08:00.827" v="4"/>
+          <ac:grpSpMkLst>
+            <pc:docMk/>
+            <pc:sldMk cId="2785217781" sldId="259"/>
+            <ac:grpSpMk id="6" creationId="{818DB153-04A8-4C32-ADD2-B8D4FB65936E}"/>
+          </ac:grpSpMkLst>
+        </pc:grpChg>
+        <pc:grpChg chg="del mod">
+          <ac:chgData name="Michael Escue" userId="ab29b3b8207ead18" providerId="LiveId" clId="{39B28FE9-6231-46D7-934C-73D56C4F3AC2}" dt="2020-03-12T19:21:56.213" v="11"/>
+          <ac:grpSpMkLst>
+            <pc:docMk/>
+            <pc:sldMk cId="2785217781" sldId="259"/>
+            <ac:grpSpMk id="8" creationId="{544B10D2-37AF-47FC-909B-3D7572D7237A}"/>
+          </ac:grpSpMkLst>
+        </pc:grpChg>
+        <pc:grpChg chg="del mod">
+          <ac:chgData name="Michael Escue" userId="ab29b3b8207ead18" providerId="LiveId" clId="{39B28FE9-6231-46D7-934C-73D56C4F3AC2}" dt="2020-03-12T19:22:19.231" v="21"/>
+          <ac:grpSpMkLst>
+            <pc:docMk/>
+            <pc:sldMk cId="2785217781" sldId="259"/>
+            <ac:grpSpMk id="14" creationId="{2E443880-E266-46EB-9E2D-2E328E963883}"/>
+          </ac:grpSpMkLst>
+        </pc:grpChg>
+        <pc:grpChg chg="mod">
+          <ac:chgData name="Michael Escue" userId="ab29b3b8207ead18" providerId="LiveId" clId="{39B28FE9-6231-46D7-934C-73D56C4F3AC2}" dt="2020-03-12T19:23:00.190" v="25"/>
+          <ac:grpSpMkLst>
+            <pc:docMk/>
+            <pc:sldMk cId="2785217781" sldId="259"/>
+            <ac:grpSpMk id="19" creationId="{733AD703-BA28-4219-BFEE-69BD89BF84B6}"/>
+          </ac:grpSpMkLst>
+        </pc:grpChg>
+        <pc:inkChg chg="add del mod">
+          <ac:chgData name="Michael Escue" userId="ab29b3b8207ead18" providerId="LiveId" clId="{39B28FE9-6231-46D7-934C-73D56C4F3AC2}" dt="2020-03-12T19:21:56.205" v="9"/>
+          <ac:inkMkLst>
+            <pc:docMk/>
+            <pc:sldMk cId="2785217781" sldId="259"/>
+            <ac:inkMk id="2" creationId="{387A458A-7F5D-4BE3-8D7F-2C053AFA034E}"/>
+          </ac:inkMkLst>
+        </pc:inkChg>
+        <pc:inkChg chg="add del mod">
+          <ac:chgData name="Michael Escue" userId="ab29b3b8207ead18" providerId="LiveId" clId="{39B28FE9-6231-46D7-934C-73D56C4F3AC2}" dt="2020-03-12T19:21:56.213" v="11"/>
+          <ac:inkMkLst>
+            <pc:docMk/>
+            <pc:sldMk cId="2785217781" sldId="259"/>
+            <ac:inkMk id="5" creationId="{CCC754D0-4C60-49D8-B0C4-FBC194D164FB}"/>
+          </ac:inkMkLst>
+        </pc:inkChg>
+        <pc:inkChg chg="add del mod">
+          <ac:chgData name="Michael Escue" userId="ab29b3b8207ead18" providerId="LiveId" clId="{39B28FE9-6231-46D7-934C-73D56C4F3AC2}" dt="2020-03-12T19:21:56.214" v="12"/>
+          <ac:inkMkLst>
+            <pc:docMk/>
+            <pc:sldMk cId="2785217781" sldId="259"/>
+            <ac:inkMk id="7" creationId="{869143DC-17CD-4EB3-81E7-29C152D63543}"/>
+          </ac:inkMkLst>
+        </pc:inkChg>
+        <pc:inkChg chg="add del">
+          <ac:chgData name="Michael Escue" userId="ab29b3b8207ead18" providerId="LiveId" clId="{39B28FE9-6231-46D7-934C-73D56C4F3AC2}" dt="2020-03-12T19:08:04.869" v="6"/>
+          <ac:inkMkLst>
+            <pc:docMk/>
+            <pc:sldMk cId="2785217781" sldId="259"/>
+            <ac:inkMk id="9" creationId="{6AD547BD-B0EE-45BB-837B-C581D7B7D7CF}"/>
+          </ac:inkMkLst>
+        </pc:inkChg>
+        <pc:inkChg chg="add del">
+          <ac:chgData name="Michael Escue" userId="ab29b3b8207ead18" providerId="LiveId" clId="{39B28FE9-6231-46D7-934C-73D56C4F3AC2}" dt="2020-03-12T19:21:56.215" v="13"/>
+          <ac:inkMkLst>
+            <pc:docMk/>
+            <pc:sldMk cId="2785217781" sldId="259"/>
+            <ac:inkMk id="10" creationId="{07F480F4-B4A7-4BD8-A379-E7D68C0FB501}"/>
+          </ac:inkMkLst>
+        </pc:inkChg>
+        <pc:inkChg chg="add del">
+          <ac:chgData name="Michael Escue" userId="ab29b3b8207ead18" providerId="LiveId" clId="{39B28FE9-6231-46D7-934C-73D56C4F3AC2}" dt="2020-03-12T19:21:56.208" v="10"/>
+          <ac:inkMkLst>
+            <pc:docMk/>
+            <pc:sldMk cId="2785217781" sldId="259"/>
+            <ac:inkMk id="11" creationId="{5958FA46-7A13-495B-B507-6D29300A376C}"/>
+          </ac:inkMkLst>
+        </pc:inkChg>
+        <pc:inkChg chg="add del mod">
+          <ac:chgData name="Michael Escue" userId="ab29b3b8207ead18" providerId="LiveId" clId="{39B28FE9-6231-46D7-934C-73D56C4F3AC2}" dt="2020-03-12T19:22:19.231" v="21"/>
+          <ac:inkMkLst>
+            <pc:docMk/>
+            <pc:sldMk cId="2785217781" sldId="259"/>
+            <ac:inkMk id="12" creationId="{4E186687-3B40-45E7-96AF-A9DD50B2979F}"/>
+          </ac:inkMkLst>
+        </pc:inkChg>
+        <pc:inkChg chg="add del mod">
+          <ac:chgData name="Michael Escue" userId="ab29b3b8207ead18" providerId="LiveId" clId="{39B28FE9-6231-46D7-934C-73D56C4F3AC2}" dt="2020-03-12T19:22:20.592" v="22"/>
+          <ac:inkMkLst>
+            <pc:docMk/>
+            <pc:sldMk cId="2785217781" sldId="259"/>
+            <ac:inkMk id="13" creationId="{B4E8F7E0-D0FD-4BCA-8C2E-FD5C7AC70DA0}"/>
+          </ac:inkMkLst>
+        </pc:inkChg>
+        <pc:inkChg chg="add del">
+          <ac:chgData name="Michael Escue" userId="ab29b3b8207ead18" providerId="LiveId" clId="{39B28FE9-6231-46D7-934C-73D56C4F3AC2}" dt="2020-03-12T19:22:19.228" v="19"/>
+          <ac:inkMkLst>
+            <pc:docMk/>
+            <pc:sldMk cId="2785217781" sldId="259"/>
+            <ac:inkMk id="15" creationId="{E402E697-AE42-49CA-951F-3EC92689E371}"/>
+          </ac:inkMkLst>
+        </pc:inkChg>
+        <pc:inkChg chg="add del">
+          <ac:chgData name="Michael Escue" userId="ab29b3b8207ead18" providerId="LiveId" clId="{39B28FE9-6231-46D7-934C-73D56C4F3AC2}" dt="2020-03-12T19:22:19.228" v="20"/>
+          <ac:inkMkLst>
+            <pc:docMk/>
+            <pc:sldMk cId="2785217781" sldId="259"/>
+            <ac:inkMk id="16" creationId="{EA5286D3-C91A-43F4-BF90-FB2460B38EC9}"/>
+          </ac:inkMkLst>
+        </pc:inkChg>
+        <pc:inkChg chg="add mod">
+          <ac:chgData name="Michael Escue" userId="ab29b3b8207ead18" providerId="LiveId" clId="{39B28FE9-6231-46D7-934C-73D56C4F3AC2}" dt="2020-03-12T19:23:00.190" v="25"/>
+          <ac:inkMkLst>
+            <pc:docMk/>
+            <pc:sldMk cId="2785217781" sldId="259"/>
+            <ac:inkMk id="17" creationId="{9A926849-B09C-47B6-8321-F8A9A12C16DE}"/>
+          </ac:inkMkLst>
+        </pc:inkChg>
+        <pc:inkChg chg="add mod">
+          <ac:chgData name="Michael Escue" userId="ab29b3b8207ead18" providerId="LiveId" clId="{39B28FE9-6231-46D7-934C-73D56C4F3AC2}" dt="2020-03-12T19:23:00.190" v="25"/>
+          <ac:inkMkLst>
+            <pc:docMk/>
+            <pc:sldMk cId="2785217781" sldId="259"/>
+            <ac:inkMk id="18" creationId="{093AAB7D-B1E7-4BEA-8628-E3309B36A6BF}"/>
+          </ac:inkMkLst>
+        </pc:inkChg>
+        <pc:inkChg chg="add del">
+          <ac:chgData name="Michael Escue" userId="ab29b3b8207ead18" providerId="LiveId" clId="{39B28FE9-6231-46D7-934C-73D56C4F3AC2}" dt="2020-03-12T19:23:04.057" v="27"/>
+          <ac:inkMkLst>
+            <pc:docMk/>
+            <pc:sldMk cId="2785217781" sldId="259"/>
+            <ac:inkMk id="20" creationId="{1AE54B53-89D5-45E3-9212-4ADEC6F21940}"/>
+          </ac:inkMkLst>
+        </pc:inkChg>
+        <pc:inkChg chg="add">
+          <ac:chgData name="Michael Escue" userId="ab29b3b8207ead18" providerId="LiveId" clId="{39B28FE9-6231-46D7-934C-73D56C4F3AC2}" dt="2020-03-12T19:23:10.867" v="28" actId="9405"/>
+          <ac:inkMkLst>
+            <pc:docMk/>
+            <pc:sldMk cId="2785217781" sldId="259"/>
+            <ac:inkMk id="21" creationId="{F9DD41A8-43D4-4577-A4A3-FB7DC343F56D}"/>
+          </ac:inkMkLst>
+        </pc:inkChg>
+        <pc:inkChg chg="add">
+          <ac:chgData name="Michael Escue" userId="ab29b3b8207ead18" providerId="LiveId" clId="{39B28FE9-6231-46D7-934C-73D56C4F3AC2}" dt="2020-03-12T19:23:11.661" v="29" actId="9405"/>
+          <ac:inkMkLst>
+            <pc:docMk/>
+            <pc:sldMk cId="2785217781" sldId="259"/>
+            <ac:inkMk id="22" creationId="{E46B607B-7060-4447-A6E3-90186EA73623}"/>
+          </ac:inkMkLst>
+        </pc:inkChg>
+      </pc:sldChg>
+    </pc:docChg>
+  </pc:docChgLst>
+</pc:chgInfo>
+</file>
+
+<file path=ppt/notesMasters/notesMaster1.xml><?xml version="1.0" encoding="utf-8"?>
+<p:notesMaster xmlns:a="http://schemas.openxmlformats.org/drawingml/2006/main" xmlns:r="http://schemas.openxmlformats.org/officeDocument/2006/relationships" xmlns:p="http://schemas.openxmlformats.org/presentationml/2006/main">
+  <p:cSld>
+    <p:bg>
+      <p:bgRef idx="1001">
+        <a:schemeClr val="bg1"/>
+      </p:bgRef>
+    </p:bg>
+    <p:spTree>
+      <p:nvGrpSpPr>
+        <p:cNvPr id="1" name=""/>
+        <p:cNvGrpSpPr/>
+        <p:nvPr/>
+      </p:nvGrpSpPr>
+      <p:grpSpPr>
+        <a:xfrm>
+          <a:off x="0" y="0"/>
+          <a:ext cx="0" cy="0"/>
+          <a:chOff x="0" y="0"/>
+          <a:chExt cx="0" cy="0"/>
+        </a:xfrm>
+      </p:grpSpPr>
+      <p:sp>
+        <p:nvSpPr>
+          <p:cNvPr id="2" name="Header Placeholder 1"/>
+          <p:cNvSpPr>
+            <a:spLocks noGrp="1"/>
+          </p:cNvSpPr>
+          <p:nvPr>
+            <p:ph type="hdr" sz="quarter"/>
+          </p:nvPr>
+        </p:nvSpPr>
+        <p:spPr>
+          <a:xfrm>
+            <a:off x="0" y="0"/>
+            <a:ext cx="2971800" cy="458788"/>
+          </a:xfrm>
+          <a:prstGeom prst="rect">
+            <a:avLst/>
+          </a:prstGeom>
+        </p:spPr>
+        <p:txBody>
+          <a:bodyPr vert="horz" lIns="91440" tIns="45720" rIns="91440" bIns="45720" rtlCol="0"/>
+          <a:lstStyle>
+            <a:lvl1pPr algn="l">
+              <a:defRPr sz="1200"/>
+            </a:lvl1pPr>
+          </a:lstStyle>
+          <a:p>
+            <a:endParaRPr lang="en-US"/>
+          </a:p>
+        </p:txBody>
+      </p:sp>
+      <p:sp>
+        <p:nvSpPr>
+          <p:cNvPr id="3" name="Date Placeholder 2"/>
+          <p:cNvSpPr>
+            <a:spLocks noGrp="1"/>
+          </p:cNvSpPr>
+          <p:nvPr>
+            <p:ph type="dt" idx="1"/>
+          </p:nvPr>
+        </p:nvSpPr>
+        <p:spPr>
+          <a:xfrm>
+            <a:off x="3884613" y="0"/>
+            <a:ext cx="2971800" cy="458788"/>
+          </a:xfrm>
+          <a:prstGeom prst="rect">
+            <a:avLst/>
+          </a:prstGeom>
+        </p:spPr>
+        <p:txBody>
+          <a:bodyPr vert="horz" lIns="91440" tIns="45720" rIns="91440" bIns="45720" rtlCol="0"/>
+          <a:lstStyle>
+            <a:lvl1pPr algn="r">
+              <a:defRPr sz="1200"/>
+            </a:lvl1pPr>
+          </a:lstStyle>
+          <a:p>
+            <a:fld id="{0B93309B-1794-4675-9278-01F32F00A6F9}" type="datetimeFigureOut">
+              <a:rPr lang="en-US" smtClean="0"/>
+              <a:t>3/12/2020</a:t>
+            </a:fld>
+            <a:endParaRPr lang="en-US"/>
+          </a:p>
+        </p:txBody>
+      </p:sp>
+      <p:sp>
+        <p:nvSpPr>
+          <p:cNvPr id="4" name="Slide Image Placeholder 3"/>
+          <p:cNvSpPr>
+            <a:spLocks noGrp="1" noRot="1" noChangeAspect="1"/>
+          </p:cNvSpPr>
+          <p:nvPr>
+            <p:ph type="sldImg" idx="2"/>
+          </p:nvPr>
+        </p:nvSpPr>
+        <p:spPr>
+          <a:xfrm>
+            <a:off x="685800" y="1143000"/>
+            <a:ext cx="5486400" cy="3086100"/>
+          </a:xfrm>
+          <a:prstGeom prst="rect">
+            <a:avLst/>
+          </a:prstGeom>
+          <a:noFill/>
+          <a:ln w="12700">
+            <a:solidFill>
+              <a:prstClr val="black"/>
+            </a:solidFill>
+          </a:ln>
+        </p:spPr>
+        <p:txBody>
+          <a:bodyPr vert="horz" lIns="91440" tIns="45720" rIns="91440" bIns="45720" rtlCol="0" anchor="ctr"/>
+          <a:lstStyle/>
+          <a:p>
+            <a:endParaRPr lang="en-US"/>
+          </a:p>
+        </p:txBody>
+      </p:sp>
+      <p:sp>
+        <p:nvSpPr>
+          <p:cNvPr id="5" name="Notes Placeholder 4"/>
+          <p:cNvSpPr>
+            <a:spLocks noGrp="1"/>
+          </p:cNvSpPr>
+          <p:nvPr>
+            <p:ph type="body" sz="quarter" idx="3"/>
+          </p:nvPr>
+        </p:nvSpPr>
+        <p:spPr>
+          <a:xfrm>
+            <a:off x="685800" y="4400550"/>
+            <a:ext cx="5486400" cy="3600450"/>
+          </a:xfrm>
+          <a:prstGeom prst="rect">
+            <a:avLst/>
+          </a:prstGeom>
+        </p:spPr>
+        <p:txBody>
+          <a:bodyPr vert="horz" lIns="91440" tIns="45720" rIns="91440" bIns="45720" rtlCol="0"/>
+          <a:lstStyle/>
+          <a:p>
+            <a:pPr lvl="0"/>
+            <a:r>
+              <a:rPr lang="en-US"/>
+              <a:t>Click to edit Master text styles</a:t>
+            </a:r>
+          </a:p>
+          <a:p>
+            <a:pPr lvl="1"/>
+            <a:r>
+              <a:rPr lang="en-US"/>
+              <a:t>Second level</a:t>
+            </a:r>
+          </a:p>
+          <a:p>
+            <a:pPr lvl="2"/>
+            <a:r>
+              <a:rPr lang="en-US"/>
+              <a:t>Third level</a:t>
+            </a:r>
+          </a:p>
+          <a:p>
+            <a:pPr lvl="3"/>
+            <a:r>
+              <a:rPr lang="en-US"/>
+              <a:t>Fourth level</a:t>
+            </a:r>
+          </a:p>
+          <a:p>
+            <a:pPr lvl="4"/>
+            <a:r>
+              <a:rPr lang="en-US"/>
+              <a:t>Fifth level</a:t>
+            </a:r>
+          </a:p>
+        </p:txBody>
+      </p:sp>
+      <p:sp>
+        <p:nvSpPr>
+          <p:cNvPr id="6" name="Footer Placeholder 5"/>
+          <p:cNvSpPr>
+            <a:spLocks noGrp="1"/>
+          </p:cNvSpPr>
+          <p:nvPr>
+            <p:ph type="ftr" sz="quarter" idx="4"/>
+          </p:nvPr>
+        </p:nvSpPr>
+        <p:spPr>
+          <a:xfrm>
+            <a:off x="0" y="8685213"/>
+            <a:ext cx="2971800" cy="458787"/>
+          </a:xfrm>
+          <a:prstGeom prst="rect">
+            <a:avLst/>
+          </a:prstGeom>
+        </p:spPr>
+        <p:txBody>
+          <a:bodyPr vert="horz" lIns="91440" tIns="45720" rIns="91440" bIns="45720" rtlCol="0" anchor="b"/>
+          <a:lstStyle>
+            <a:lvl1pPr algn="l">
+              <a:defRPr sz="1200"/>
+            </a:lvl1pPr>
+          </a:lstStyle>
+          <a:p>
+            <a:endParaRPr lang="en-US"/>
+          </a:p>
+        </p:txBody>
+      </p:sp>
+      <p:sp>
+        <p:nvSpPr>
+          <p:cNvPr id="7" name="Slide Number Placeholder 6"/>
+          <p:cNvSpPr>
+            <a:spLocks noGrp="1"/>
+          </p:cNvSpPr>
+          <p:nvPr>
+            <p:ph type="sldNum" sz="quarter" idx="5"/>
+          </p:nvPr>
+        </p:nvSpPr>
+        <p:spPr>
+          <a:xfrm>
+            <a:off x="3884613" y="8685213"/>
+            <a:ext cx="2971800" cy="458787"/>
+          </a:xfrm>
+          <a:prstGeom prst="rect">
+            <a:avLst/>
+          </a:prstGeom>
+        </p:spPr>
+        <p:txBody>
+          <a:bodyPr vert="horz" lIns="91440" tIns="45720" rIns="91440" bIns="45720" rtlCol="0" anchor="b"/>
+          <a:lstStyle>
+            <a:lvl1pPr algn="r">
+              <a:defRPr sz="1200"/>
+            </a:lvl1pPr>
+          </a:lstStyle>
+          <a:p>
+            <a:fld id="{B6C5E20D-8959-4F42-99A6-ADE28D2A026F}" type="slidenum">
+              <a:rPr lang="en-US" smtClean="0"/>
+              <a:t>‹#›</a:t>
+            </a:fld>
+            <a:endParaRPr lang="en-US"/>
+          </a:p>
+        </p:txBody>
+      </p:sp>
+    </p:spTree>
+    <p:extLst>
+      <p:ext uri="{BB962C8B-B14F-4D97-AF65-F5344CB8AC3E}">
+        <p14:creationId xmlns:p14="http://schemas.microsoft.com/office/powerpoint/2010/main" val="1008794378"/>
+      </p:ext>
+    </p:extLst>
+  </p:cSld>
+  <p:clrMap bg1="lt1" tx1="dk1" bg2="lt2" tx2="dk2" accent1="accent1" accent2="accent2" accent3="accent3" accent4="accent4" accent5="accent5" accent6="accent6" hlink="hlink" folHlink="folHlink"/>
+  <p:notesStyle>
+    <a:lvl1pPr marL="0" algn="l" defTabSz="914400" rtl="0" eaLnBrk="1" latinLnBrk="0" hangingPunct="1">
+      <a:defRPr sz="1200" kern="1200">
+        <a:solidFill>
+          <a:schemeClr val="tx1"/>
+        </a:solidFill>
+        <a:latin typeface="+mn-lt"/>
+        <a:ea typeface="+mn-ea"/>
+        <a:cs typeface="+mn-cs"/>
+      </a:defRPr>
+    </a:lvl1pPr>
+    <a:lvl2pPr marL="457200" algn="l" defTabSz="914400" rtl="0" eaLnBrk="1" latinLnBrk="0" hangingPunct="1">
+      <a:defRPr sz="1200" kern="1200">
+        <a:solidFill>
+          <a:schemeClr val="tx1"/>
+        </a:solidFill>
+        <a:latin typeface="+mn-lt"/>
+        <a:ea typeface="+mn-ea"/>
+        <a:cs typeface="+mn-cs"/>
+      </a:defRPr>
+    </a:lvl2pPr>
+    <a:lvl3pPr marL="914400" algn="l" defTabSz="914400" rtl="0" eaLnBrk="1" latinLnBrk="0" hangingPunct="1">
+      <a:defRPr sz="1200" kern="1200">
+        <a:solidFill>
+          <a:schemeClr val="tx1"/>
+        </a:solidFill>
+        <a:latin typeface="+mn-lt"/>
+        <a:ea typeface="+mn-ea"/>
+        <a:cs typeface="+mn-cs"/>
+      </a:defRPr>
+    </a:lvl3pPr>
+    <a:lvl4pPr marL="1371600" algn="l" defTabSz="914400" rtl="0" eaLnBrk="1" latinLnBrk="0" hangingPunct="1">
+      <a:defRPr sz="1200" kern="1200">
+        <a:solidFill>
+          <a:schemeClr val="tx1"/>
+        </a:solidFill>
+        <a:latin typeface="+mn-lt"/>
+        <a:ea typeface="+mn-ea"/>
+        <a:cs typeface="+mn-cs"/>
+      </a:defRPr>
+    </a:lvl4pPr>
+    <a:lvl5pPr marL="1828800" algn="l" defTabSz="914400" rtl="0" eaLnBrk="1" latinLnBrk="0" hangingPunct="1">
+      <a:defRPr sz="1200" kern="1200">
+        <a:solidFill>
+          <a:schemeClr val="tx1"/>
+        </a:solidFill>
+        <a:latin typeface="+mn-lt"/>
+        <a:ea typeface="+mn-ea"/>
+        <a:cs typeface="+mn-cs"/>
+      </a:defRPr>
+    </a:lvl5pPr>
+    <a:lvl6pPr marL="2286000" algn="l" defTabSz="914400" rtl="0" eaLnBrk="1" latinLnBrk="0" hangingPunct="1">
+      <a:defRPr sz="1200" kern="1200">
+        <a:solidFill>
+          <a:schemeClr val="tx1"/>
+        </a:solidFill>
+        <a:latin typeface="+mn-lt"/>
+        <a:ea typeface="+mn-ea"/>
+        <a:cs typeface="+mn-cs"/>
+      </a:defRPr>
+    </a:lvl6pPr>
+    <a:lvl7pPr marL="2743200" algn="l" defTabSz="914400" rtl="0" eaLnBrk="1" latinLnBrk="0" hangingPunct="1">
+      <a:defRPr sz="1200" kern="1200">
+        <a:solidFill>
+          <a:schemeClr val="tx1"/>
+        </a:solidFill>
+        <a:latin typeface="+mn-lt"/>
+        <a:ea typeface="+mn-ea"/>
+        <a:cs typeface="+mn-cs"/>
+      </a:defRPr>
+    </a:lvl7pPr>
+    <a:lvl8pPr marL="3200400" algn="l" defTabSz="914400" rtl="0" eaLnBrk="1" latinLnBrk="0" hangingPunct="1">
+      <a:defRPr sz="1200" kern="1200">
+        <a:solidFill>
+          <a:schemeClr val="tx1"/>
+        </a:solidFill>
+        <a:latin typeface="+mn-lt"/>
+        <a:ea typeface="+mn-ea"/>
+        <a:cs typeface="+mn-cs"/>
+      </a:defRPr>
+    </a:lvl8pPr>
+    <a:lvl9pPr marL="3657600" algn="l" defTabSz="914400" rtl="0" eaLnBrk="1" latinLnBrk="0" hangingPunct="1">
+      <a:defRPr sz="1200" kern="1200">
+        <a:solidFill>
+          <a:schemeClr val="tx1"/>
+        </a:solidFill>
+        <a:latin typeface="+mn-lt"/>
+        <a:ea typeface="+mn-ea"/>
+        <a:cs typeface="+mn-cs"/>
+      </a:defRPr>
+    </a:lvl9pPr>
+  </p:notesStyle>
+</p:notesMaster>
+</file>
+
+<file path=ppt/notesSlides/notesSlide1.xml><?xml version="1.0" encoding="utf-8"?>
+<p:notes xmlns:a="http://schemas.openxmlformats.org/drawingml/2006/main" xmlns:r="http://schemas.openxmlformats.org/officeDocument/2006/relationships" xmlns:p="http://schemas.openxmlformats.org/presentationml/2006/main">
+  <p:cSld>
+    <p:spTree>
+      <p:nvGrpSpPr>
+        <p:cNvPr id="1" name=""/>
+        <p:cNvGrpSpPr/>
+        <p:nvPr/>
+      </p:nvGrpSpPr>
+      <p:grpSpPr>
+        <a:xfrm>
+          <a:off x="0" y="0"/>
+          <a:ext cx="0" cy="0"/>
+          <a:chOff x="0" y="0"/>
+          <a:chExt cx="0" cy="0"/>
+        </a:xfrm>
+      </p:grpSpPr>
+      <p:sp>
+        <p:nvSpPr>
+          <p:cNvPr id="2" name="Slide Image Placeholder 1"/>
+          <p:cNvSpPr>
+            <a:spLocks noGrp="1" noRot="1" noChangeAspect="1"/>
+          </p:cNvSpPr>
+          <p:nvPr>
+            <p:ph type="sldImg"/>
+          </p:nvPr>
+        </p:nvSpPr>
+        <p:spPr/>
+      </p:sp>
+      <p:sp>
+        <p:nvSpPr>
+          <p:cNvPr id="3" name="Notes Placeholder 2"/>
+          <p:cNvSpPr>
+            <a:spLocks noGrp="1"/>
+          </p:cNvSpPr>
+          <p:nvPr>
+            <p:ph type="body" idx="1"/>
+          </p:nvPr>
+        </p:nvSpPr>
+        <p:spPr/>
+        <p:txBody>
+          <a:bodyPr/>
+          <a:lstStyle/>
+          <a:p>
+            <a:endParaRPr lang="en-US" dirty="0"/>
+          </a:p>
+        </p:txBody>
+      </p:sp>
+      <p:sp>
+        <p:nvSpPr>
+          <p:cNvPr id="4" name="Slide Number Placeholder 3"/>
+          <p:cNvSpPr>
+            <a:spLocks noGrp="1"/>
+          </p:cNvSpPr>
+          <p:nvPr>
+            <p:ph type="sldNum" sz="quarter" idx="5"/>
+          </p:nvPr>
+        </p:nvSpPr>
+        <p:spPr/>
+        <p:txBody>
+          <a:bodyPr/>
+          <a:lstStyle/>
+          <a:p>
+            <a:fld id="{B6C5E20D-8959-4F42-99A6-ADE28D2A026F}" type="slidenum">
+              <a:rPr lang="en-US" smtClean="0"/>
+              <a:t>5</a:t>
+            </a:fld>
+            <a:endParaRPr lang="en-US"/>
+          </a:p>
+        </p:txBody>
+      </p:sp>
+    </p:spTree>
+    <p:extLst>
+      <p:ext uri="{BB962C8B-B14F-4D97-AF65-F5344CB8AC3E}">
+        <p14:creationId xmlns:p14="http://schemas.microsoft.com/office/powerpoint/2010/main" val="77412310"/>
+      </p:ext>
+    </p:extLst>
+  </p:cSld>
+  <p:clrMapOvr>
+    <a:masterClrMapping/>
+  </p:clrMapOvr>
+</p:notes>
 </file>
 
 <file path=ppt/slideLayouts/slideLayout1.xml><?xml version="1.0" encoding="utf-8"?>
@@ -258,7 +880,7 @@
           <a:p>
             <a:fld id="{72E1D21E-6574-41C7-9951-8290AD241749}" type="datetimeFigureOut">
               <a:rPr lang="en-US" smtClean="0"/>
-              <a:t>3/11/2020</a:t>
+              <a:t>3/12/2020</a:t>
             </a:fld>
             <a:endParaRPr lang="en-US"/>
           </a:p>
@@ -456,7 +1078,7 @@
           <a:p>
             <a:fld id="{72E1D21E-6574-41C7-9951-8290AD241749}" type="datetimeFigureOut">
               <a:rPr lang="en-US" smtClean="0"/>
-              <a:t>3/11/2020</a:t>
+              <a:t>3/12/2020</a:t>
             </a:fld>
             <a:endParaRPr lang="en-US"/>
           </a:p>
@@ -664,7 +1286,7 @@
           <a:p>
             <a:fld id="{72E1D21E-6574-41C7-9951-8290AD241749}" type="datetimeFigureOut">
               <a:rPr lang="en-US" smtClean="0"/>
-              <a:t>3/11/2020</a:t>
+              <a:t>3/12/2020</a:t>
             </a:fld>
             <a:endParaRPr lang="en-US"/>
           </a:p>
@@ -862,7 +1484,7 @@
           <a:p>
             <a:fld id="{72E1D21E-6574-41C7-9951-8290AD241749}" type="datetimeFigureOut">
               <a:rPr lang="en-US" smtClean="0"/>
-              <a:t>3/11/2020</a:t>
+              <a:t>3/12/2020</a:t>
             </a:fld>
             <a:endParaRPr lang="en-US"/>
           </a:p>
@@ -1137,7 +1759,7 @@
           <a:p>
             <a:fld id="{72E1D21E-6574-41C7-9951-8290AD241749}" type="datetimeFigureOut">
               <a:rPr lang="en-US" smtClean="0"/>
-              <a:t>3/11/2020</a:t>
+              <a:t>3/12/2020</a:t>
             </a:fld>
             <a:endParaRPr lang="en-US"/>
           </a:p>
@@ -1402,7 +2024,7 @@
           <a:p>
             <a:fld id="{72E1D21E-6574-41C7-9951-8290AD241749}" type="datetimeFigureOut">
               <a:rPr lang="en-US" smtClean="0"/>
-              <a:t>3/11/2020</a:t>
+              <a:t>3/12/2020</a:t>
             </a:fld>
             <a:endParaRPr lang="en-US"/>
           </a:p>
@@ -1814,7 +2436,7 @@
           <a:p>
             <a:fld id="{72E1D21E-6574-41C7-9951-8290AD241749}" type="datetimeFigureOut">
               <a:rPr lang="en-US" smtClean="0"/>
-              <a:t>3/11/2020</a:t>
+              <a:t>3/12/2020</a:t>
             </a:fld>
             <a:endParaRPr lang="en-US"/>
           </a:p>
@@ -1955,7 +2577,7 @@
           <a:p>
             <a:fld id="{72E1D21E-6574-41C7-9951-8290AD241749}" type="datetimeFigureOut">
               <a:rPr lang="en-US" smtClean="0"/>
-              <a:t>3/11/2020</a:t>
+              <a:t>3/12/2020</a:t>
             </a:fld>
             <a:endParaRPr lang="en-US"/>
           </a:p>
@@ -2068,7 +2690,7 @@
           <a:p>
             <a:fld id="{72E1D21E-6574-41C7-9951-8290AD241749}" type="datetimeFigureOut">
               <a:rPr lang="en-US" smtClean="0"/>
-              <a:t>3/11/2020</a:t>
+              <a:t>3/12/2020</a:t>
             </a:fld>
             <a:endParaRPr lang="en-US"/>
           </a:p>
@@ -2379,7 +3001,7 @@
           <a:p>
             <a:fld id="{72E1D21E-6574-41C7-9951-8290AD241749}" type="datetimeFigureOut">
               <a:rPr lang="en-US" smtClean="0"/>
-              <a:t>3/11/2020</a:t>
+              <a:t>3/12/2020</a:t>
             </a:fld>
             <a:endParaRPr lang="en-US"/>
           </a:p>
@@ -2667,7 +3289,7 @@
           <a:p>
             <a:fld id="{72E1D21E-6574-41C7-9951-8290AD241749}" type="datetimeFigureOut">
               <a:rPr lang="en-US" smtClean="0"/>
-              <a:t>3/11/2020</a:t>
+              <a:t>3/12/2020</a:t>
             </a:fld>
             <a:endParaRPr lang="en-US"/>
           </a:p>
@@ -2908,7 +3530,7 @@
           <a:p>
             <a:fld id="{72E1D21E-6574-41C7-9951-8290AD241749}" type="datetimeFigureOut">
               <a:rPr lang="en-US" smtClean="0"/>
-              <a:t>3/11/2020</a:t>
+              <a:t>3/12/2020</a:t>
             </a:fld>
             <a:endParaRPr lang="en-US"/>
           </a:p>
@@ -3756,7 +4378,7 @@
           <p:nvPr/>
         </p:nvPicPr>
         <p:blipFill rotWithShape="1">
-          <a:blip r:embed="rId2"/>
+          <a:blip r:embed="rId3"/>
           <a:srcRect l="19293" t="56957" r="13695" b="2174"/>
           <a:stretch/>
         </p:blipFill>
@@ -4076,4 +4698,299 @@
     </a:ext>
   </a:extLst>
 </a:theme>
+</file>
+
+<file path=ppt/theme/theme2.xml><?xml version="1.0" encoding="utf-8"?>
+<a:theme xmlns:a="http://schemas.openxmlformats.org/drawingml/2006/main" name="Office Theme">
+  <a:themeElements>
+    <a:clrScheme name="Office">
+      <a:dk1>
+        <a:sysClr val="windowText" lastClr="000000"/>
+      </a:dk1>
+      <a:lt1>
+        <a:sysClr val="window" lastClr="FFFFFF"/>
+      </a:lt1>
+      <a:dk2>
+        <a:srgbClr val="44546A"/>
+      </a:dk2>
+      <a:lt2>
+        <a:srgbClr val="E7E6E6"/>
+      </a:lt2>
+      <a:accent1>
+        <a:srgbClr val="4472C4"/>
+      </a:accent1>
+      <a:accent2>
+        <a:srgbClr val="ED7D31"/>
+      </a:accent2>
+      <a:accent3>
+        <a:srgbClr val="A5A5A5"/>
+      </a:accent3>
+      <a:accent4>
+        <a:srgbClr val="FFC000"/>
+      </a:accent4>
+      <a:accent5>
+        <a:srgbClr val="5B9BD5"/>
+      </a:accent5>
+      <a:accent6>
+        <a:srgbClr val="70AD47"/>
+      </a:accent6>
+      <a:hlink>
+        <a:srgbClr val="0563C1"/>
+      </a:hlink>
+      <a:folHlink>
+        <a:srgbClr val="954F72"/>
+      </a:folHlink>
+    </a:clrScheme>
+    <a:fontScheme name="Office">
+      <a:majorFont>
+        <a:latin typeface="Calibri Light" panose="020F0302020204030204"/>
+        <a:ea typeface=""/>
+        <a:cs typeface=""/>
+        <a:font script="Jpan" typeface="游ゴシック Light"/>
+        <a:font script="Hang" typeface="맑은 고딕"/>
+        <a:font script="Hans" typeface="等线 Light"/>
+        <a:font script="Hant" typeface="新細明體"/>
+        <a:font script="Arab" typeface="Times New Roman"/>
+        <a:font script="Hebr" typeface="Times New Roman"/>
+        <a:font script="Thai" typeface="Angsana New"/>
+        <a:font script="Ethi" typeface="Nyala"/>
+        <a:font script="Beng" typeface="Vrinda"/>
+        <a:font script="Gujr" typeface="Shruti"/>
+        <a:font script="Khmr" typeface="MoolBoran"/>
+        <a:font script="Knda" typeface="Tunga"/>
+        <a:font script="Guru" typeface="Raavi"/>
+        <a:font script="Cans" typeface="Euphemia"/>
+        <a:font script="Cher" typeface="Plantagenet Cherokee"/>
+        <a:font script="Yiii" typeface="Microsoft Yi Baiti"/>
+        <a:font script="Tibt" typeface="Microsoft Himalaya"/>
+        <a:font script="Thaa" typeface="MV Boli"/>
+        <a:font script="Deva" typeface="Mangal"/>
+        <a:font script="Telu" typeface="Gautami"/>
+        <a:font script="Taml" typeface="Latha"/>
+        <a:font script="Syrc" typeface="Estrangelo Edessa"/>
+        <a:font script="Orya" typeface="Kalinga"/>
+        <a:font script="Mlym" typeface="Kartika"/>
+        <a:font script="Laoo" typeface="DokChampa"/>
+        <a:font script="Sinh" typeface="Iskoola Pota"/>
+        <a:font script="Mong" typeface="Mongolian Baiti"/>
+        <a:font script="Viet" typeface="Times New Roman"/>
+        <a:font script="Uigh" typeface="Microsoft Uighur"/>
+        <a:font script="Geor" typeface="Sylfaen"/>
+        <a:font script="Armn" typeface="Arial"/>
+        <a:font script="Bugi" typeface="Leelawadee UI"/>
+        <a:font script="Bopo" typeface="Microsoft JhengHei"/>
+        <a:font script="Java" typeface="Javanese Text"/>
+        <a:font script="Lisu" typeface="Segoe UI"/>
+        <a:font script="Mymr" typeface="Myanmar Text"/>
+        <a:font script="Nkoo" typeface="Ebrima"/>
+        <a:font script="Olck" typeface="Nirmala UI"/>
+        <a:font script="Osma" typeface="Ebrima"/>
+        <a:font script="Phag" typeface="Phagspa"/>
+        <a:font script="Syrn" typeface="Estrangelo Edessa"/>
+        <a:font script="Syrj" typeface="Estrangelo Edessa"/>
+        <a:font script="Syre" typeface="Estrangelo Edessa"/>
+        <a:font script="Sora" typeface="Nirmala UI"/>
+        <a:font script="Tale" typeface="Microsoft Tai Le"/>
+        <a:font script="Talu" typeface="Microsoft New Tai Lue"/>
+        <a:font script="Tfng" typeface="Ebrima"/>
+      </a:majorFont>
+      <a:minorFont>
+        <a:latin typeface="Calibri" panose="020F0502020204030204"/>
+        <a:ea typeface=""/>
+        <a:cs typeface=""/>
+        <a:font script="Jpan" typeface="游ゴシック"/>
+        <a:font script="Hang" typeface="맑은 고딕"/>
+        <a:font script="Hans" typeface="等线"/>
+        <a:font script="Hant" typeface="新細明體"/>
+        <a:font script="Arab" typeface="Arial"/>
+        <a:font script="Hebr" typeface="Arial"/>
+        <a:font script="Thai" typeface="Cordia New"/>
+        <a:font script="Ethi" typeface="Nyala"/>
+        <a:font script="Beng" typeface="Vrinda"/>
+        <a:font script="Gujr" typeface="Shruti"/>
+        <a:font script="Khmr" typeface="DaunPenh"/>
+        <a:font script="Knda" typeface="Tunga"/>
+        <a:font script="Guru" typeface="Raavi"/>
+        <a:font script="Cans" typeface="Euphemia"/>
+        <a:font script="Cher" typeface="Plantagenet Cherokee"/>
+        <a:font script="Yiii" typeface="Microsoft Yi Baiti"/>
+        <a:font script="Tibt" typeface="Microsoft Himalaya"/>
+        <a:font script="Thaa" typeface="MV Boli"/>
+        <a:font script="Deva" typeface="Mangal"/>
+        <a:font script="Telu" typeface="Gautami"/>
+        <a:font script="Taml" typeface="Latha"/>
+        <a:font script="Syrc" typeface="Estrangelo Edessa"/>
+        <a:font script="Orya" typeface="Kalinga"/>
+        <a:font script="Mlym" typeface="Kartika"/>
+        <a:font script="Laoo" typeface="DokChampa"/>
+        <a:font script="Sinh" typeface="Iskoola Pota"/>
+        <a:font script="Mong" typeface="Mongolian Baiti"/>
+        <a:font script="Viet" typeface="Arial"/>
+        <a:font script="Uigh" typeface="Microsoft Uighur"/>
+        <a:font script="Geor" typeface="Sylfaen"/>
+        <a:font script="Armn" typeface="Arial"/>
+        <a:font script="Bugi" typeface="Leelawadee UI"/>
+        <a:font script="Bopo" typeface="Microsoft JhengHei"/>
+        <a:font script="Java" typeface="Javanese Text"/>
+        <a:font script="Lisu" typeface="Segoe UI"/>
+        <a:font script="Mymr" typeface="Myanmar Text"/>
+        <a:font script="Nkoo" typeface="Ebrima"/>
+        <a:font script="Olck" typeface="Nirmala UI"/>
+        <a:font script="Osma" typeface="Ebrima"/>
+        <a:font script="Phag" typeface="Phagspa"/>
+        <a:font script="Syrn" typeface="Estrangelo Edessa"/>
+        <a:font script="Syrj" typeface="Estrangelo Edessa"/>
+        <a:font script="Syre" typeface="Estrangelo Edessa"/>
+        <a:font script="Sora" typeface="Nirmala UI"/>
+        <a:font script="Tale" typeface="Microsoft Tai Le"/>
+        <a:font script="Talu" typeface="Microsoft New Tai Lue"/>
+        <a:font script="Tfng" typeface="Ebrima"/>
+      </a:minorFont>
+    </a:fontScheme>
+    <a:fmtScheme name="Office">
+      <a:fillStyleLst>
+        <a:solidFill>
+          <a:schemeClr val="phClr"/>
+        </a:solidFill>
+        <a:gradFill rotWithShape="1">
+          <a:gsLst>
+            <a:gs pos="0">
+              <a:schemeClr val="phClr">
+                <a:lumMod val="110000"/>
+                <a:satMod val="105000"/>
+                <a:tint val="67000"/>
+              </a:schemeClr>
+            </a:gs>
+            <a:gs pos="50000">
+              <a:schemeClr val="phClr">
+                <a:lumMod val="105000"/>
+                <a:satMod val="103000"/>
+                <a:tint val="73000"/>
+              </a:schemeClr>
+            </a:gs>
+            <a:gs pos="100000">
+              <a:schemeClr val="phClr">
+                <a:lumMod val="105000"/>
+                <a:satMod val="109000"/>
+                <a:tint val="81000"/>
+              </a:schemeClr>
+            </a:gs>
+          </a:gsLst>
+          <a:lin ang="5400000" scaled="0"/>
+        </a:gradFill>
+        <a:gradFill rotWithShape="1">
+          <a:gsLst>
+            <a:gs pos="0">
+              <a:schemeClr val="phClr">
+                <a:satMod val="103000"/>
+                <a:lumMod val="102000"/>
+                <a:tint val="94000"/>
+              </a:schemeClr>
+            </a:gs>
+            <a:gs pos="50000">
+              <a:schemeClr val="phClr">
+                <a:satMod val="110000"/>
+                <a:lumMod val="100000"/>
+                <a:shade val="100000"/>
+              </a:schemeClr>
+            </a:gs>
+            <a:gs pos="100000">
+              <a:schemeClr val="phClr">
+                <a:lumMod val="99000"/>
+                <a:satMod val="120000"/>
+                <a:shade val="78000"/>
+              </a:schemeClr>
+            </a:gs>
+          </a:gsLst>
+          <a:lin ang="5400000" scaled="0"/>
+        </a:gradFill>
+      </a:fillStyleLst>
+      <a:lnStyleLst>
+        <a:ln w="6350" cap="flat" cmpd="sng" algn="ctr">
+          <a:solidFill>
+            <a:schemeClr val="phClr"/>
+          </a:solidFill>
+          <a:prstDash val="solid"/>
+          <a:miter lim="800000"/>
+        </a:ln>
+        <a:ln w="12700" cap="flat" cmpd="sng" algn="ctr">
+          <a:solidFill>
+            <a:schemeClr val="phClr"/>
+          </a:solidFill>
+          <a:prstDash val="solid"/>
+          <a:miter lim="800000"/>
+        </a:ln>
+        <a:ln w="19050" cap="flat" cmpd="sng" algn="ctr">
+          <a:solidFill>
+            <a:schemeClr val="phClr"/>
+          </a:solidFill>
+          <a:prstDash val="solid"/>
+          <a:miter lim="800000"/>
+        </a:ln>
+      </a:lnStyleLst>
+      <a:effectStyleLst>
+        <a:effectStyle>
+          <a:effectLst/>
+        </a:effectStyle>
+        <a:effectStyle>
+          <a:effectLst/>
+        </a:effectStyle>
+        <a:effectStyle>
+          <a:effectLst>
+            <a:outerShdw blurRad="57150" dist="19050" dir="5400000" algn="ctr" rotWithShape="0">
+              <a:srgbClr val="000000">
+                <a:alpha val="63000"/>
+              </a:srgbClr>
+            </a:outerShdw>
+          </a:effectLst>
+        </a:effectStyle>
+      </a:effectStyleLst>
+      <a:bgFillStyleLst>
+        <a:solidFill>
+          <a:schemeClr val="phClr"/>
+        </a:solidFill>
+        <a:solidFill>
+          <a:schemeClr val="phClr">
+            <a:tint val="95000"/>
+            <a:satMod val="170000"/>
+          </a:schemeClr>
+        </a:solidFill>
+        <a:gradFill rotWithShape="1">
+          <a:gsLst>
+            <a:gs pos="0">
+              <a:schemeClr val="phClr">
+                <a:tint val="93000"/>
+                <a:satMod val="150000"/>
+                <a:shade val="98000"/>
+                <a:lumMod val="102000"/>
+              </a:schemeClr>
+            </a:gs>
+            <a:gs pos="50000">
+              <a:schemeClr val="phClr">
+                <a:tint val="98000"/>
+                <a:satMod val="130000"/>
+                <a:shade val="90000"/>
+                <a:lumMod val="103000"/>
+              </a:schemeClr>
+            </a:gs>
+            <a:gs pos="100000">
+              <a:schemeClr val="phClr">
+                <a:shade val="63000"/>
+                <a:satMod val="120000"/>
+              </a:schemeClr>
+            </a:gs>
+          </a:gsLst>
+          <a:lin ang="5400000" scaled="0"/>
+        </a:gradFill>
+      </a:bgFillStyleLst>
+    </a:fmtScheme>
+  </a:themeElements>
+  <a:objectDefaults/>
+  <a:extraClrSchemeLst/>
+  <a:extLst>
+    <a:ext uri="{05A4C25C-085E-4340-85A3-A5531E510DB2}">
+      <thm15:themeFamily xmlns:thm15="http://schemas.microsoft.com/office/thememl/2012/main" name="Office Theme" id="{62F939B6-93AF-4DB8-9C6B-D6C7DFDC589F}" vid="{4A3C46E8-61CC-4603-A589-7422A47A8E4A}"/>
+    </a:ext>
+  </a:extLst>
+</a:theme>
 </file>
</xml_diff>